<commit_message>
final commit for refactoring
</commit_message>
<xml_diff>
--- a/Refactoring #2.pptx
+++ b/Refactoring #2.pptx
@@ -4,6 +4,9 @@
   <p:sldMasterIdLst>
     <p:sldMasterId id="2147483672" r:id="rId1"/>
   </p:sldMasterIdLst>
+  <p:notesMasterIdLst>
+    <p:notesMasterId r:id="rId7"/>
+  </p:notesMasterIdLst>
   <p:sldIdLst>
     <p:sldId id="256" r:id="rId2"/>
     <p:sldId id="258" r:id="rId3"/>
@@ -116,6 +119,1453 @@
 </p:presentation>
 </file>
 
+<file path=ppt/notesMasters/notesMaster1.xml><?xml version="1.0" encoding="utf-8"?>
+<p:notesMaster xmlns:a="http://schemas.openxmlformats.org/drawingml/2006/main" xmlns:r="http://schemas.openxmlformats.org/officeDocument/2006/relationships" xmlns:p="http://schemas.openxmlformats.org/presentationml/2006/main">
+  <p:cSld>
+    <p:bg>
+      <p:bgRef idx="1001">
+        <a:schemeClr val="bg1"/>
+      </p:bgRef>
+    </p:bg>
+    <p:spTree>
+      <p:nvGrpSpPr>
+        <p:cNvPr id="1" name=""/>
+        <p:cNvGrpSpPr/>
+        <p:nvPr/>
+      </p:nvGrpSpPr>
+      <p:grpSpPr>
+        <a:xfrm>
+          <a:off x="0" y="0"/>
+          <a:ext cx="0" cy="0"/>
+          <a:chOff x="0" y="0"/>
+          <a:chExt cx="0" cy="0"/>
+        </a:xfrm>
+      </p:grpSpPr>
+      <p:sp>
+        <p:nvSpPr>
+          <p:cNvPr id="2" name="머리글 개체 틀 1"/>
+          <p:cNvSpPr>
+            <a:spLocks noGrp="1"/>
+          </p:cNvSpPr>
+          <p:nvPr>
+            <p:ph type="hdr" sz="quarter"/>
+          </p:nvPr>
+        </p:nvSpPr>
+        <p:spPr>
+          <a:xfrm>
+            <a:off x="0" y="0"/>
+            <a:ext cx="2971800" cy="458788"/>
+          </a:xfrm>
+          <a:prstGeom prst="rect">
+            <a:avLst/>
+          </a:prstGeom>
+        </p:spPr>
+        <p:txBody>
+          <a:bodyPr vert="horz" lIns="91440" tIns="45720" rIns="91440" bIns="45720" rtlCol="0"/>
+          <a:lstStyle>
+            <a:lvl1pPr algn="l">
+              <a:defRPr sz="1200"/>
+            </a:lvl1pPr>
+          </a:lstStyle>
+          <a:p>
+            <a:endParaRPr lang="ko-KR" altLang="en-US"/>
+          </a:p>
+        </p:txBody>
+      </p:sp>
+      <p:sp>
+        <p:nvSpPr>
+          <p:cNvPr id="3" name="날짜 개체 틀 2"/>
+          <p:cNvSpPr>
+            <a:spLocks noGrp="1"/>
+          </p:cNvSpPr>
+          <p:nvPr>
+            <p:ph type="dt" idx="1"/>
+          </p:nvPr>
+        </p:nvSpPr>
+        <p:spPr>
+          <a:xfrm>
+            <a:off x="3884613" y="0"/>
+            <a:ext cx="2971800" cy="458788"/>
+          </a:xfrm>
+          <a:prstGeom prst="rect">
+            <a:avLst/>
+          </a:prstGeom>
+        </p:spPr>
+        <p:txBody>
+          <a:bodyPr vert="horz" lIns="91440" tIns="45720" rIns="91440" bIns="45720" rtlCol="0"/>
+          <a:lstStyle>
+            <a:lvl1pPr algn="r">
+              <a:defRPr sz="1200"/>
+            </a:lvl1pPr>
+          </a:lstStyle>
+          <a:p>
+            <a:fld id="{18522D3D-C61A-4446-BB51-72038882E8D7}" type="datetimeFigureOut">
+              <a:rPr lang="ko-KR" altLang="en-US" smtClean="0"/>
+              <a:t>2020-02-15</a:t>
+            </a:fld>
+            <a:endParaRPr lang="ko-KR" altLang="en-US"/>
+          </a:p>
+        </p:txBody>
+      </p:sp>
+      <p:sp>
+        <p:nvSpPr>
+          <p:cNvPr id="4" name="슬라이드 이미지 개체 틀 3"/>
+          <p:cNvSpPr>
+            <a:spLocks noGrp="1" noRot="1" noChangeAspect="1"/>
+          </p:cNvSpPr>
+          <p:nvPr>
+            <p:ph type="sldImg" idx="2"/>
+          </p:nvPr>
+        </p:nvSpPr>
+        <p:spPr>
+          <a:xfrm>
+            <a:off x="1371600" y="1143000"/>
+            <a:ext cx="4114800" cy="3086100"/>
+          </a:xfrm>
+          <a:prstGeom prst="rect">
+            <a:avLst/>
+          </a:prstGeom>
+          <a:noFill/>
+          <a:ln w="12700">
+            <a:solidFill>
+              <a:prstClr val="black"/>
+            </a:solidFill>
+          </a:ln>
+        </p:spPr>
+        <p:txBody>
+          <a:bodyPr vert="horz" lIns="91440" tIns="45720" rIns="91440" bIns="45720" rtlCol="0" anchor="ctr"/>
+          <a:lstStyle/>
+          <a:p>
+            <a:endParaRPr lang="ko-KR" altLang="en-US"/>
+          </a:p>
+        </p:txBody>
+      </p:sp>
+      <p:sp>
+        <p:nvSpPr>
+          <p:cNvPr id="5" name="슬라이드 노트 개체 틀 4"/>
+          <p:cNvSpPr>
+            <a:spLocks noGrp="1"/>
+          </p:cNvSpPr>
+          <p:nvPr>
+            <p:ph type="body" sz="quarter" idx="3"/>
+          </p:nvPr>
+        </p:nvSpPr>
+        <p:spPr>
+          <a:xfrm>
+            <a:off x="685800" y="4400550"/>
+            <a:ext cx="5486400" cy="3600450"/>
+          </a:xfrm>
+          <a:prstGeom prst="rect">
+            <a:avLst/>
+          </a:prstGeom>
+        </p:spPr>
+        <p:txBody>
+          <a:bodyPr vert="horz" lIns="91440" tIns="45720" rIns="91440" bIns="45720" rtlCol="0"/>
+          <a:lstStyle/>
+          <a:p>
+            <a:pPr lvl="0"/>
+            <a:r>
+              <a:rPr lang="ko-KR" altLang="en-US"/>
+              <a:t>마스터 텍스트 스타일을 편집하려면 클릭</a:t>
+            </a:r>
+          </a:p>
+          <a:p>
+            <a:pPr lvl="1"/>
+            <a:r>
+              <a:rPr lang="ko-KR" altLang="en-US"/>
+              <a:t>두 번째 수준</a:t>
+            </a:r>
+          </a:p>
+          <a:p>
+            <a:pPr lvl="2"/>
+            <a:r>
+              <a:rPr lang="ko-KR" altLang="en-US"/>
+              <a:t>세 번째 수준</a:t>
+            </a:r>
+          </a:p>
+          <a:p>
+            <a:pPr lvl="3"/>
+            <a:r>
+              <a:rPr lang="ko-KR" altLang="en-US"/>
+              <a:t>네 번째 수준</a:t>
+            </a:r>
+          </a:p>
+          <a:p>
+            <a:pPr lvl="4"/>
+            <a:r>
+              <a:rPr lang="ko-KR" altLang="en-US"/>
+              <a:t>다섯 번째 수준</a:t>
+            </a:r>
+          </a:p>
+        </p:txBody>
+      </p:sp>
+      <p:sp>
+        <p:nvSpPr>
+          <p:cNvPr id="6" name="바닥글 개체 틀 5"/>
+          <p:cNvSpPr>
+            <a:spLocks noGrp="1"/>
+          </p:cNvSpPr>
+          <p:nvPr>
+            <p:ph type="ftr" sz="quarter" idx="4"/>
+          </p:nvPr>
+        </p:nvSpPr>
+        <p:spPr>
+          <a:xfrm>
+            <a:off x="0" y="8685213"/>
+            <a:ext cx="2971800" cy="458787"/>
+          </a:xfrm>
+          <a:prstGeom prst="rect">
+            <a:avLst/>
+          </a:prstGeom>
+        </p:spPr>
+        <p:txBody>
+          <a:bodyPr vert="horz" lIns="91440" tIns="45720" rIns="91440" bIns="45720" rtlCol="0" anchor="b"/>
+          <a:lstStyle>
+            <a:lvl1pPr algn="l">
+              <a:defRPr sz="1200"/>
+            </a:lvl1pPr>
+          </a:lstStyle>
+          <a:p>
+            <a:endParaRPr lang="ko-KR" altLang="en-US"/>
+          </a:p>
+        </p:txBody>
+      </p:sp>
+      <p:sp>
+        <p:nvSpPr>
+          <p:cNvPr id="7" name="슬라이드 번호 개체 틀 6"/>
+          <p:cNvSpPr>
+            <a:spLocks noGrp="1"/>
+          </p:cNvSpPr>
+          <p:nvPr>
+            <p:ph type="sldNum" sz="quarter" idx="5"/>
+          </p:nvPr>
+        </p:nvSpPr>
+        <p:spPr>
+          <a:xfrm>
+            <a:off x="3884613" y="8685213"/>
+            <a:ext cx="2971800" cy="458787"/>
+          </a:xfrm>
+          <a:prstGeom prst="rect">
+            <a:avLst/>
+          </a:prstGeom>
+        </p:spPr>
+        <p:txBody>
+          <a:bodyPr vert="horz" lIns="91440" tIns="45720" rIns="91440" bIns="45720" rtlCol="0" anchor="b"/>
+          <a:lstStyle>
+            <a:lvl1pPr algn="r">
+              <a:defRPr sz="1200"/>
+            </a:lvl1pPr>
+          </a:lstStyle>
+          <a:p>
+            <a:fld id="{6F2E3D4E-D25E-42DA-8920-C4C893A9BA4D}" type="slidenum">
+              <a:rPr lang="ko-KR" altLang="en-US" smtClean="0"/>
+              <a:t>‹#›</a:t>
+            </a:fld>
+            <a:endParaRPr lang="ko-KR" altLang="en-US"/>
+          </a:p>
+        </p:txBody>
+      </p:sp>
+    </p:spTree>
+    <p:extLst>
+      <p:ext uri="{BB962C8B-B14F-4D97-AF65-F5344CB8AC3E}">
+        <p14:creationId xmlns:p14="http://schemas.microsoft.com/office/powerpoint/2010/main" val="2252382314"/>
+      </p:ext>
+    </p:extLst>
+  </p:cSld>
+  <p:clrMap bg1="lt1" tx1="dk1" bg2="lt2" tx2="dk2" accent1="accent1" accent2="accent2" accent3="accent3" accent4="accent4" accent5="accent5" accent6="accent6" hlink="hlink" folHlink="folHlink"/>
+  <p:notesStyle>
+    <a:lvl1pPr marL="0" algn="l" defTabSz="914400" rtl="0" eaLnBrk="1" latinLnBrk="1" hangingPunct="1">
+      <a:defRPr sz="1200" kern="1200">
+        <a:solidFill>
+          <a:schemeClr val="tx1"/>
+        </a:solidFill>
+        <a:latin typeface="+mn-lt"/>
+        <a:ea typeface="+mn-ea"/>
+        <a:cs typeface="+mn-cs"/>
+      </a:defRPr>
+    </a:lvl1pPr>
+    <a:lvl2pPr marL="457200" algn="l" defTabSz="914400" rtl="0" eaLnBrk="1" latinLnBrk="1" hangingPunct="1">
+      <a:defRPr sz="1200" kern="1200">
+        <a:solidFill>
+          <a:schemeClr val="tx1"/>
+        </a:solidFill>
+        <a:latin typeface="+mn-lt"/>
+        <a:ea typeface="+mn-ea"/>
+        <a:cs typeface="+mn-cs"/>
+      </a:defRPr>
+    </a:lvl2pPr>
+    <a:lvl3pPr marL="914400" algn="l" defTabSz="914400" rtl="0" eaLnBrk="1" latinLnBrk="1" hangingPunct="1">
+      <a:defRPr sz="1200" kern="1200">
+        <a:solidFill>
+          <a:schemeClr val="tx1"/>
+        </a:solidFill>
+        <a:latin typeface="+mn-lt"/>
+        <a:ea typeface="+mn-ea"/>
+        <a:cs typeface="+mn-cs"/>
+      </a:defRPr>
+    </a:lvl3pPr>
+    <a:lvl4pPr marL="1371600" algn="l" defTabSz="914400" rtl="0" eaLnBrk="1" latinLnBrk="1" hangingPunct="1">
+      <a:defRPr sz="1200" kern="1200">
+        <a:solidFill>
+          <a:schemeClr val="tx1"/>
+        </a:solidFill>
+        <a:latin typeface="+mn-lt"/>
+        <a:ea typeface="+mn-ea"/>
+        <a:cs typeface="+mn-cs"/>
+      </a:defRPr>
+    </a:lvl4pPr>
+    <a:lvl5pPr marL="1828800" algn="l" defTabSz="914400" rtl="0" eaLnBrk="1" latinLnBrk="1" hangingPunct="1">
+      <a:defRPr sz="1200" kern="1200">
+        <a:solidFill>
+          <a:schemeClr val="tx1"/>
+        </a:solidFill>
+        <a:latin typeface="+mn-lt"/>
+        <a:ea typeface="+mn-ea"/>
+        <a:cs typeface="+mn-cs"/>
+      </a:defRPr>
+    </a:lvl5pPr>
+    <a:lvl6pPr marL="2286000" algn="l" defTabSz="914400" rtl="0" eaLnBrk="1" latinLnBrk="1" hangingPunct="1">
+      <a:defRPr sz="1200" kern="1200">
+        <a:solidFill>
+          <a:schemeClr val="tx1"/>
+        </a:solidFill>
+        <a:latin typeface="+mn-lt"/>
+        <a:ea typeface="+mn-ea"/>
+        <a:cs typeface="+mn-cs"/>
+      </a:defRPr>
+    </a:lvl6pPr>
+    <a:lvl7pPr marL="2743200" algn="l" defTabSz="914400" rtl="0" eaLnBrk="1" latinLnBrk="1" hangingPunct="1">
+      <a:defRPr sz="1200" kern="1200">
+        <a:solidFill>
+          <a:schemeClr val="tx1"/>
+        </a:solidFill>
+        <a:latin typeface="+mn-lt"/>
+        <a:ea typeface="+mn-ea"/>
+        <a:cs typeface="+mn-cs"/>
+      </a:defRPr>
+    </a:lvl7pPr>
+    <a:lvl8pPr marL="3200400" algn="l" defTabSz="914400" rtl="0" eaLnBrk="1" latinLnBrk="1" hangingPunct="1">
+      <a:defRPr sz="1200" kern="1200">
+        <a:solidFill>
+          <a:schemeClr val="tx1"/>
+        </a:solidFill>
+        <a:latin typeface="+mn-lt"/>
+        <a:ea typeface="+mn-ea"/>
+        <a:cs typeface="+mn-cs"/>
+      </a:defRPr>
+    </a:lvl8pPr>
+    <a:lvl9pPr marL="3657600" algn="l" defTabSz="914400" rtl="0" eaLnBrk="1" latinLnBrk="1" hangingPunct="1">
+      <a:defRPr sz="1200" kern="1200">
+        <a:solidFill>
+          <a:schemeClr val="tx1"/>
+        </a:solidFill>
+        <a:latin typeface="+mn-lt"/>
+        <a:ea typeface="+mn-ea"/>
+        <a:cs typeface="+mn-cs"/>
+      </a:defRPr>
+    </a:lvl9pPr>
+  </p:notesStyle>
+</p:notesMaster>
+</file>
+
+<file path=ppt/notesSlides/notesSlide1.xml><?xml version="1.0" encoding="utf-8"?>
+<p:notes xmlns:a="http://schemas.openxmlformats.org/drawingml/2006/main" xmlns:r="http://schemas.openxmlformats.org/officeDocument/2006/relationships" xmlns:p="http://schemas.openxmlformats.org/presentationml/2006/main">
+  <p:cSld>
+    <p:spTree>
+      <p:nvGrpSpPr>
+        <p:cNvPr id="1" name=""/>
+        <p:cNvGrpSpPr/>
+        <p:nvPr/>
+      </p:nvGrpSpPr>
+      <p:grpSpPr>
+        <a:xfrm>
+          <a:off x="0" y="0"/>
+          <a:ext cx="0" cy="0"/>
+          <a:chOff x="0" y="0"/>
+          <a:chExt cx="0" cy="0"/>
+        </a:xfrm>
+      </p:grpSpPr>
+      <p:sp>
+        <p:nvSpPr>
+          <p:cNvPr id="2" name="슬라이드 이미지 개체 틀 1"/>
+          <p:cNvSpPr>
+            <a:spLocks noGrp="1" noRot="1" noChangeAspect="1"/>
+          </p:cNvSpPr>
+          <p:nvPr>
+            <p:ph type="sldImg"/>
+          </p:nvPr>
+        </p:nvSpPr>
+        <p:spPr/>
+      </p:sp>
+      <p:sp>
+        <p:nvSpPr>
+          <p:cNvPr id="3" name="슬라이드 노트 개체 틀 2"/>
+          <p:cNvSpPr>
+            <a:spLocks noGrp="1"/>
+          </p:cNvSpPr>
+          <p:nvPr>
+            <p:ph type="body" idx="1"/>
+          </p:nvPr>
+        </p:nvSpPr>
+        <p:spPr/>
+        <p:txBody>
+          <a:bodyPr/>
+          <a:lstStyle/>
+          <a:p>
+            <a:r>
+              <a:rPr lang="ko-KR" altLang="en-US" dirty="0"/>
+              <a:t>안녕하세요</a:t>
+            </a:r>
+            <a:endParaRPr lang="en-US" altLang="ko-KR" dirty="0"/>
+          </a:p>
+          <a:p>
+            <a:r>
+              <a:rPr lang="en-US" altLang="ko-KR" dirty="0"/>
+              <a:t>Refactoring </a:t>
+            </a:r>
+            <a:r>
+              <a:rPr lang="ko-KR" altLang="en-US" dirty="0"/>
+              <a:t>두번째 발표를 시작하겠습니다</a:t>
+            </a:r>
+            <a:r>
+              <a:rPr lang="en-US" altLang="ko-KR" dirty="0"/>
+              <a:t>.</a:t>
+            </a:r>
+          </a:p>
+          <a:p>
+            <a:endParaRPr lang="en-US" altLang="ko-KR" dirty="0"/>
+          </a:p>
+        </p:txBody>
+      </p:sp>
+      <p:sp>
+        <p:nvSpPr>
+          <p:cNvPr id="4" name="슬라이드 번호 개체 틀 3"/>
+          <p:cNvSpPr>
+            <a:spLocks noGrp="1"/>
+          </p:cNvSpPr>
+          <p:nvPr>
+            <p:ph type="sldNum" sz="quarter" idx="5"/>
+          </p:nvPr>
+        </p:nvSpPr>
+        <p:spPr/>
+        <p:txBody>
+          <a:bodyPr/>
+          <a:lstStyle/>
+          <a:p>
+            <a:fld id="{6F2E3D4E-D25E-42DA-8920-C4C893A9BA4D}" type="slidenum">
+              <a:rPr lang="ko-KR" altLang="en-US" smtClean="0"/>
+              <a:t>1</a:t>
+            </a:fld>
+            <a:endParaRPr lang="ko-KR" altLang="en-US"/>
+          </a:p>
+        </p:txBody>
+      </p:sp>
+    </p:spTree>
+    <p:extLst>
+      <p:ext uri="{BB962C8B-B14F-4D97-AF65-F5344CB8AC3E}">
+        <p14:creationId xmlns:p14="http://schemas.microsoft.com/office/powerpoint/2010/main" val="1716781668"/>
+      </p:ext>
+    </p:extLst>
+  </p:cSld>
+  <p:clrMapOvr>
+    <a:masterClrMapping/>
+  </p:clrMapOvr>
+</p:notes>
+</file>
+
+<file path=ppt/notesSlides/notesSlide2.xml><?xml version="1.0" encoding="utf-8"?>
+<p:notes xmlns:a="http://schemas.openxmlformats.org/drawingml/2006/main" xmlns:r="http://schemas.openxmlformats.org/officeDocument/2006/relationships" xmlns:p="http://schemas.openxmlformats.org/presentationml/2006/main">
+  <p:cSld>
+    <p:spTree>
+      <p:nvGrpSpPr>
+        <p:cNvPr id="1" name=""/>
+        <p:cNvGrpSpPr/>
+        <p:nvPr/>
+      </p:nvGrpSpPr>
+      <p:grpSpPr>
+        <a:xfrm>
+          <a:off x="0" y="0"/>
+          <a:ext cx="0" cy="0"/>
+          <a:chOff x="0" y="0"/>
+          <a:chExt cx="0" cy="0"/>
+        </a:xfrm>
+      </p:grpSpPr>
+      <p:sp>
+        <p:nvSpPr>
+          <p:cNvPr id="2" name="슬라이드 이미지 개체 틀 1"/>
+          <p:cNvSpPr>
+            <a:spLocks noGrp="1" noRot="1" noChangeAspect="1"/>
+          </p:cNvSpPr>
+          <p:nvPr>
+            <p:ph type="sldImg"/>
+          </p:nvPr>
+        </p:nvSpPr>
+        <p:spPr/>
+      </p:sp>
+      <p:sp>
+        <p:nvSpPr>
+          <p:cNvPr id="3" name="슬라이드 노트 개체 틀 2"/>
+          <p:cNvSpPr>
+            <a:spLocks noGrp="1"/>
+          </p:cNvSpPr>
+          <p:nvPr>
+            <p:ph type="body" idx="1"/>
+          </p:nvPr>
+        </p:nvSpPr>
+        <p:spPr/>
+        <p:txBody>
+          <a:bodyPr/>
+          <a:lstStyle/>
+          <a:p>
+            <a:r>
+              <a:rPr lang="ko-KR" altLang="en-US" dirty="0"/>
+              <a:t>빌 </a:t>
+            </a:r>
+            <a:r>
+              <a:rPr lang="ko-KR" altLang="en-US" dirty="0" err="1"/>
+              <a:t>옵다이크는</a:t>
+            </a:r>
+            <a:r>
+              <a:rPr lang="ko-KR" altLang="en-US" dirty="0"/>
+              <a:t> 우리가 읽은 </a:t>
+            </a:r>
+            <a:r>
+              <a:rPr lang="en-US" altLang="ko-KR" dirty="0"/>
+              <a:t>Refactoring </a:t>
+            </a:r>
+            <a:r>
+              <a:rPr lang="ko-KR" altLang="en-US" dirty="0"/>
+              <a:t>책의 </a:t>
+            </a:r>
+            <a:r>
+              <a:rPr lang="en-US" altLang="ko-KR" dirty="0"/>
+              <a:t>13</a:t>
+            </a:r>
+            <a:r>
+              <a:rPr lang="ko-KR" altLang="en-US" dirty="0"/>
+              <a:t>장을 작성한 저자 중 </a:t>
+            </a:r>
+            <a:r>
+              <a:rPr lang="ko-KR" altLang="en-US" dirty="0" err="1"/>
+              <a:t>한명입니다</a:t>
+            </a:r>
+            <a:r>
+              <a:rPr lang="en-US" altLang="ko-KR" dirty="0"/>
+              <a:t>.</a:t>
+            </a:r>
+          </a:p>
+          <a:p>
+            <a:r>
+              <a:rPr lang="ko-KR" altLang="en-US" dirty="0"/>
+              <a:t>그리고 </a:t>
+            </a:r>
+            <a:r>
+              <a:rPr lang="en-US" altLang="ko-KR" dirty="0"/>
+              <a:t>13</a:t>
+            </a:r>
+            <a:r>
+              <a:rPr lang="ko-KR" altLang="en-US" dirty="0"/>
+              <a:t>장에서 </a:t>
+            </a:r>
+            <a:r>
+              <a:rPr lang="ko-KR" altLang="en-US" dirty="0" err="1"/>
+              <a:t>위와같이</a:t>
+            </a:r>
+            <a:r>
+              <a:rPr lang="ko-KR" altLang="en-US" dirty="0"/>
+              <a:t> </a:t>
+            </a:r>
+            <a:r>
+              <a:rPr lang="ko-KR" altLang="en-US" dirty="0" err="1"/>
+              <a:t>리팩토링을</a:t>
+            </a:r>
+            <a:r>
+              <a:rPr lang="ko-KR" altLang="en-US" dirty="0"/>
+              <a:t> 건강에 비유를 하고 있습니다</a:t>
+            </a:r>
+            <a:r>
+              <a:rPr lang="en-US" altLang="ko-KR" dirty="0"/>
+              <a:t>.</a:t>
+            </a:r>
+          </a:p>
+          <a:p>
+            <a:endParaRPr lang="en-US" altLang="ko-KR" dirty="0"/>
+          </a:p>
+          <a:p>
+            <a:r>
+              <a:rPr lang="ko-KR" altLang="en-US" dirty="0" err="1"/>
+              <a:t>위와같이</a:t>
+            </a:r>
+            <a:r>
+              <a:rPr lang="ko-KR" altLang="en-US" dirty="0"/>
+              <a:t> 말 한 이유는 두 가지 정도가 있을 것 같아요</a:t>
+            </a:r>
+            <a:r>
+              <a:rPr lang="en-US" altLang="ko-KR" dirty="0"/>
+              <a:t>.</a:t>
+            </a:r>
+          </a:p>
+          <a:p>
+            <a:endParaRPr lang="en-US" altLang="ko-KR" dirty="0"/>
+          </a:p>
+          <a:p>
+            <a:r>
+              <a:rPr lang="ko-KR" altLang="en-US" dirty="0"/>
+              <a:t>첫째는 </a:t>
+            </a:r>
+            <a:r>
+              <a:rPr lang="ko-KR" altLang="en-US" dirty="0" err="1"/>
+              <a:t>꾸준함입니다</a:t>
+            </a:r>
+            <a:r>
+              <a:rPr lang="en-US" altLang="ko-KR" dirty="0"/>
+              <a:t>.</a:t>
+            </a:r>
+          </a:p>
+          <a:p>
+            <a:endParaRPr lang="en-US" altLang="ko-KR" dirty="0"/>
+          </a:p>
+          <a:p>
+            <a:r>
+              <a:rPr lang="ko-KR" altLang="en-US" dirty="0"/>
+              <a:t>두번째는 해도 크게 달라지지 않는 것 같지만 시간이 지나면 큰 차이가 나는 것</a:t>
+            </a:r>
+            <a:r>
+              <a:rPr lang="en-US" altLang="ko-KR" dirty="0"/>
+              <a:t>.</a:t>
+            </a:r>
+            <a:endParaRPr lang="ko-KR" altLang="en-US" dirty="0"/>
+          </a:p>
+        </p:txBody>
+      </p:sp>
+      <p:sp>
+        <p:nvSpPr>
+          <p:cNvPr id="4" name="슬라이드 번호 개체 틀 3"/>
+          <p:cNvSpPr>
+            <a:spLocks noGrp="1"/>
+          </p:cNvSpPr>
+          <p:nvPr>
+            <p:ph type="sldNum" sz="quarter" idx="5"/>
+          </p:nvPr>
+        </p:nvSpPr>
+        <p:spPr/>
+        <p:txBody>
+          <a:bodyPr/>
+          <a:lstStyle/>
+          <a:p>
+            <a:fld id="{6F2E3D4E-D25E-42DA-8920-C4C893A9BA4D}" type="slidenum">
+              <a:rPr lang="ko-KR" altLang="en-US" smtClean="0"/>
+              <a:t>2</a:t>
+            </a:fld>
+            <a:endParaRPr lang="ko-KR" altLang="en-US"/>
+          </a:p>
+        </p:txBody>
+      </p:sp>
+    </p:spTree>
+    <p:extLst>
+      <p:ext uri="{BB962C8B-B14F-4D97-AF65-F5344CB8AC3E}">
+        <p14:creationId xmlns:p14="http://schemas.microsoft.com/office/powerpoint/2010/main" val="2342754215"/>
+      </p:ext>
+    </p:extLst>
+  </p:cSld>
+  <p:clrMapOvr>
+    <a:masterClrMapping/>
+  </p:clrMapOvr>
+</p:notes>
+</file>
+
+<file path=ppt/notesSlides/notesSlide3.xml><?xml version="1.0" encoding="utf-8"?>
+<p:notes xmlns:a="http://schemas.openxmlformats.org/drawingml/2006/main" xmlns:r="http://schemas.openxmlformats.org/officeDocument/2006/relationships" xmlns:p="http://schemas.openxmlformats.org/presentationml/2006/main">
+  <p:cSld>
+    <p:spTree>
+      <p:nvGrpSpPr>
+        <p:cNvPr id="1" name=""/>
+        <p:cNvGrpSpPr/>
+        <p:nvPr/>
+      </p:nvGrpSpPr>
+      <p:grpSpPr>
+        <a:xfrm>
+          <a:off x="0" y="0"/>
+          <a:ext cx="0" cy="0"/>
+          <a:chOff x="0" y="0"/>
+          <a:chExt cx="0" cy="0"/>
+        </a:xfrm>
+      </p:grpSpPr>
+      <p:sp>
+        <p:nvSpPr>
+          <p:cNvPr id="2" name="슬라이드 이미지 개체 틀 1"/>
+          <p:cNvSpPr>
+            <a:spLocks noGrp="1" noRot="1" noChangeAspect="1"/>
+          </p:cNvSpPr>
+          <p:nvPr>
+            <p:ph type="sldImg"/>
+          </p:nvPr>
+        </p:nvSpPr>
+        <p:spPr/>
+      </p:sp>
+      <p:sp>
+        <p:nvSpPr>
+          <p:cNvPr id="3" name="슬라이드 노트 개체 틀 2"/>
+          <p:cNvSpPr>
+            <a:spLocks noGrp="1"/>
+          </p:cNvSpPr>
+          <p:nvPr>
+            <p:ph type="body" idx="1"/>
+          </p:nvPr>
+        </p:nvSpPr>
+        <p:spPr/>
+        <p:txBody>
+          <a:bodyPr/>
+          <a:lstStyle/>
+          <a:p>
+            <a:r>
+              <a:rPr lang="en-US" altLang="ko-KR" dirty="0"/>
+              <a:t>8</a:t>
+            </a:r>
+            <a:r>
+              <a:rPr lang="ko-KR" altLang="en-US" dirty="0"/>
+              <a:t>장 </a:t>
+            </a:r>
+            <a:r>
+              <a:rPr lang="en-US" altLang="ko-KR" dirty="0"/>
+              <a:t>~ 11</a:t>
+            </a:r>
+            <a:r>
+              <a:rPr lang="ko-KR" altLang="en-US" dirty="0"/>
+              <a:t>장</a:t>
+            </a:r>
+            <a:endParaRPr lang="en-US" altLang="ko-KR" dirty="0"/>
+          </a:p>
+          <a:p>
+            <a:r>
+              <a:rPr lang="ko-KR" altLang="en-US" dirty="0"/>
+              <a:t>약간 이질감이 느껴지는 단어는 체계화인데 제가 마틴 </a:t>
+            </a:r>
+            <a:r>
+              <a:rPr lang="ko-KR" altLang="en-US" dirty="0" err="1"/>
+              <a:t>파울러</a:t>
+            </a:r>
+            <a:r>
+              <a:rPr lang="ko-KR" altLang="en-US" dirty="0"/>
+              <a:t> </a:t>
+            </a:r>
+            <a:r>
+              <a:rPr lang="ko-KR" altLang="en-US" dirty="0" err="1"/>
+              <a:t>블로그에가서</a:t>
+            </a:r>
+            <a:r>
+              <a:rPr lang="ko-KR" altLang="en-US" dirty="0"/>
+              <a:t> 책의 </a:t>
+            </a:r>
+            <a:r>
+              <a:rPr lang="en-US" altLang="ko-KR" dirty="0"/>
+              <a:t>catalo</a:t>
+            </a:r>
+            <a:r>
+              <a:rPr lang="ko-KR" altLang="en-US" dirty="0"/>
+              <a:t>를 보니까 영어로는 </a:t>
+            </a:r>
+            <a:r>
+              <a:rPr lang="en-US" altLang="ko-KR" dirty="0"/>
+              <a:t>organize data</a:t>
+            </a:r>
+            <a:r>
+              <a:rPr lang="ko-KR" altLang="en-US" dirty="0"/>
+              <a:t>라고 </a:t>
+            </a:r>
+            <a:r>
+              <a:rPr lang="ko-KR" altLang="en-US" dirty="0" err="1"/>
+              <a:t>쓰여있더라구요</a:t>
+            </a:r>
+            <a:r>
+              <a:rPr lang="en-US" altLang="ko-KR" dirty="0"/>
+              <a:t>.</a:t>
+            </a:r>
+            <a:r>
+              <a:rPr lang="ko-KR" altLang="en-US" dirty="0"/>
+              <a:t> 정리</a:t>
+            </a:r>
+            <a:r>
+              <a:rPr lang="en-US" altLang="ko-KR" dirty="0"/>
+              <a:t>, </a:t>
+            </a:r>
+            <a:r>
+              <a:rPr lang="ko-KR" altLang="en-US" dirty="0"/>
+              <a:t>조직화</a:t>
+            </a:r>
+            <a:r>
+              <a:rPr lang="en-US" altLang="ko-KR" dirty="0"/>
+              <a:t>, </a:t>
+            </a:r>
+            <a:r>
+              <a:rPr lang="ko-KR" altLang="en-US" dirty="0"/>
+              <a:t>분류</a:t>
+            </a:r>
+            <a:endParaRPr lang="en-US" altLang="ko-KR" dirty="0"/>
+          </a:p>
+          <a:p>
+            <a:r>
+              <a:rPr lang="ko-KR" altLang="en-US" dirty="0"/>
+              <a:t>체계화라는 단어는 좀 구체적일 것 같지만 책에서는 데이터의 추상화를 설명하고 있는 것으로 보입니다</a:t>
+            </a:r>
+            <a:r>
+              <a:rPr lang="en-US" altLang="ko-KR" dirty="0"/>
+              <a:t>.</a:t>
+            </a:r>
+          </a:p>
+          <a:p>
+            <a:r>
+              <a:rPr lang="ko-KR" altLang="en-US" dirty="0"/>
+              <a:t>따라서 </a:t>
+            </a:r>
+            <a:r>
+              <a:rPr lang="ko-KR" altLang="en-US" dirty="0" err="1"/>
+              <a:t>네개의</a:t>
+            </a:r>
+            <a:r>
+              <a:rPr lang="ko-KR" altLang="en-US" dirty="0"/>
+              <a:t> 단어가 일맥상통한다고 봐도 될 것 같아요</a:t>
+            </a:r>
+            <a:endParaRPr lang="en-US" altLang="ko-KR" dirty="0"/>
+          </a:p>
+          <a:p>
+            <a:endParaRPr lang="en-US" altLang="ko-KR" dirty="0"/>
+          </a:p>
+          <a:p>
+            <a:r>
+              <a:rPr lang="ko-KR" altLang="en-US" dirty="0"/>
+              <a:t>그리고 이 네가지 단어는 </a:t>
+            </a:r>
+            <a:r>
+              <a:rPr lang="en-US" altLang="ko-KR" dirty="0"/>
+              <a:t>Refactoring</a:t>
+            </a:r>
+            <a:r>
+              <a:rPr lang="ko-KR" altLang="en-US" dirty="0"/>
+              <a:t>의 방향성을 나타낸다고 볼 수 있습니다</a:t>
+            </a:r>
+            <a:r>
+              <a:rPr lang="en-US" altLang="ko-KR" dirty="0"/>
+              <a:t>.</a:t>
+            </a:r>
+          </a:p>
+        </p:txBody>
+      </p:sp>
+      <p:sp>
+        <p:nvSpPr>
+          <p:cNvPr id="4" name="슬라이드 번호 개체 틀 3"/>
+          <p:cNvSpPr>
+            <a:spLocks noGrp="1"/>
+          </p:cNvSpPr>
+          <p:nvPr>
+            <p:ph type="sldNum" sz="quarter" idx="5"/>
+          </p:nvPr>
+        </p:nvSpPr>
+        <p:spPr/>
+        <p:txBody>
+          <a:bodyPr/>
+          <a:lstStyle/>
+          <a:p>
+            <a:fld id="{6F2E3D4E-D25E-42DA-8920-C4C893A9BA4D}" type="slidenum">
+              <a:rPr lang="ko-KR" altLang="en-US" smtClean="0"/>
+              <a:t>3</a:t>
+            </a:fld>
+            <a:endParaRPr lang="ko-KR" altLang="en-US"/>
+          </a:p>
+        </p:txBody>
+      </p:sp>
+    </p:spTree>
+    <p:extLst>
+      <p:ext uri="{BB962C8B-B14F-4D97-AF65-F5344CB8AC3E}">
+        <p14:creationId xmlns:p14="http://schemas.microsoft.com/office/powerpoint/2010/main" val="695056836"/>
+      </p:ext>
+    </p:extLst>
+  </p:cSld>
+  <p:clrMapOvr>
+    <a:masterClrMapping/>
+  </p:clrMapOvr>
+</p:notes>
+</file>
+
+<file path=ppt/notesSlides/notesSlide4.xml><?xml version="1.0" encoding="utf-8"?>
+<p:notes xmlns:a="http://schemas.openxmlformats.org/drawingml/2006/main" xmlns:r="http://schemas.openxmlformats.org/officeDocument/2006/relationships" xmlns:p="http://schemas.openxmlformats.org/presentationml/2006/main">
+  <p:cSld>
+    <p:spTree>
+      <p:nvGrpSpPr>
+        <p:cNvPr id="1" name=""/>
+        <p:cNvGrpSpPr/>
+        <p:nvPr/>
+      </p:nvGrpSpPr>
+      <p:grpSpPr>
+        <a:xfrm>
+          <a:off x="0" y="0"/>
+          <a:ext cx="0" cy="0"/>
+          <a:chOff x="0" y="0"/>
+          <a:chExt cx="0" cy="0"/>
+        </a:xfrm>
+      </p:grpSpPr>
+      <p:sp>
+        <p:nvSpPr>
+          <p:cNvPr id="2" name="슬라이드 이미지 개체 틀 1"/>
+          <p:cNvSpPr>
+            <a:spLocks noGrp="1" noRot="1" noChangeAspect="1"/>
+          </p:cNvSpPr>
+          <p:nvPr>
+            <p:ph type="sldImg"/>
+          </p:nvPr>
+        </p:nvSpPr>
+        <p:spPr/>
+      </p:sp>
+      <p:sp>
+        <p:nvSpPr>
+          <p:cNvPr id="3" name="슬라이드 노트 개체 틀 2"/>
+          <p:cNvSpPr>
+            <a:spLocks noGrp="1"/>
+          </p:cNvSpPr>
+          <p:nvPr>
+            <p:ph type="body" idx="1"/>
+          </p:nvPr>
+        </p:nvSpPr>
+        <p:spPr/>
+        <p:txBody>
+          <a:bodyPr/>
+          <a:lstStyle/>
+          <a:p>
+            <a:r>
+              <a:rPr lang="ko-KR" altLang="en-US" sz="1200" b="0" i="0" kern="1200" dirty="0">
+                <a:solidFill>
+                  <a:schemeClr val="tx1"/>
+                </a:solidFill>
+                <a:effectLst/>
+                <a:latin typeface="+mn-lt"/>
+                <a:ea typeface="+mn-ea"/>
+                <a:cs typeface="+mn-cs"/>
+              </a:rPr>
+              <a:t>캡슐화 </a:t>
+            </a:r>
+            <a:r>
+              <a:rPr lang="en-US" altLang="ko-KR" sz="1200" b="0" i="0" kern="1200" dirty="0">
+                <a:solidFill>
+                  <a:schemeClr val="tx1"/>
+                </a:solidFill>
+                <a:effectLst/>
+                <a:latin typeface="+mn-lt"/>
+                <a:ea typeface="+mn-ea"/>
+                <a:cs typeface="+mn-cs"/>
+              </a:rPr>
+              <a:t>: </a:t>
+            </a:r>
+            <a:r>
+              <a:rPr lang="ko-KR" altLang="en-US" sz="1200" b="0" i="0" kern="1200" dirty="0">
+                <a:solidFill>
+                  <a:schemeClr val="tx1"/>
+                </a:solidFill>
+                <a:effectLst/>
+                <a:latin typeface="+mn-lt"/>
+                <a:ea typeface="+mn-ea"/>
+                <a:cs typeface="+mn-cs"/>
+              </a:rPr>
+              <a:t>실제 구현 내용 일부를 외부에 감추어 은닉한다</a:t>
+            </a:r>
+            <a:r>
+              <a:rPr lang="en-US" altLang="ko-KR" sz="1200" b="0" i="0" kern="1200" dirty="0">
+                <a:solidFill>
+                  <a:schemeClr val="tx1"/>
+                </a:solidFill>
+                <a:effectLst/>
+                <a:latin typeface="+mn-lt"/>
+                <a:ea typeface="+mn-ea"/>
+                <a:cs typeface="+mn-cs"/>
+              </a:rPr>
+              <a:t>.</a:t>
+            </a:r>
+          </a:p>
+          <a:p>
+            <a:endParaRPr lang="en-US" altLang="ko-KR" sz="1200" b="0" i="0" kern="1200" dirty="0">
+              <a:solidFill>
+                <a:schemeClr val="tx1"/>
+              </a:solidFill>
+              <a:effectLst/>
+              <a:latin typeface="+mn-lt"/>
+              <a:ea typeface="+mn-ea"/>
+              <a:cs typeface="+mn-cs"/>
+            </a:endParaRPr>
+          </a:p>
+          <a:p>
+            <a:r>
+              <a:rPr lang="ko-KR" altLang="en-US" sz="1200" b="0" i="0" kern="1200" dirty="0">
+                <a:solidFill>
+                  <a:schemeClr val="tx1"/>
+                </a:solidFill>
+                <a:effectLst/>
+                <a:latin typeface="+mn-lt"/>
+                <a:ea typeface="+mn-ea"/>
+                <a:cs typeface="+mn-cs"/>
+              </a:rPr>
+              <a:t>데이터 필드의 캡슐화 </a:t>
+            </a:r>
+            <a:r>
+              <a:rPr lang="ko-KR" altLang="en-US" sz="1200" b="0" i="0" kern="1200" dirty="0" err="1">
+                <a:solidFill>
+                  <a:schemeClr val="tx1"/>
+                </a:solidFill>
+                <a:effectLst/>
+                <a:latin typeface="+mn-lt"/>
+                <a:ea typeface="+mn-ea"/>
+                <a:cs typeface="+mn-cs"/>
+              </a:rPr>
+              <a:t>라고</a:t>
+            </a:r>
+            <a:r>
+              <a:rPr lang="ko-KR" altLang="en-US" sz="1200" b="0" i="0" kern="1200" dirty="0">
+                <a:solidFill>
+                  <a:schemeClr val="tx1"/>
+                </a:solidFill>
+                <a:effectLst/>
+                <a:latin typeface="+mn-lt"/>
+                <a:ea typeface="+mn-ea"/>
+                <a:cs typeface="+mn-cs"/>
+              </a:rPr>
+              <a:t> 하는 것은 외부에서 직접 데이터에 접근하는 것을 막고 이를 간접적으로 읽기</a:t>
+            </a:r>
+            <a:r>
+              <a:rPr lang="en-US" altLang="ko-KR" sz="1200" b="0" i="0" kern="1200" dirty="0">
+                <a:solidFill>
+                  <a:schemeClr val="tx1"/>
+                </a:solidFill>
+                <a:effectLst/>
+                <a:latin typeface="+mn-lt"/>
+                <a:ea typeface="+mn-ea"/>
+                <a:cs typeface="+mn-cs"/>
+              </a:rPr>
+              <a:t>/ </a:t>
+            </a:r>
+            <a:r>
+              <a:rPr lang="ko-KR" altLang="en-US" sz="1200" b="0" i="0" kern="1200" dirty="0">
+                <a:solidFill>
+                  <a:schemeClr val="tx1"/>
+                </a:solidFill>
+                <a:effectLst/>
+                <a:latin typeface="+mn-lt"/>
+                <a:ea typeface="+mn-ea"/>
+                <a:cs typeface="+mn-cs"/>
+              </a:rPr>
+              <a:t>쓰기 메서드를 통해 접근하게 하는 것</a:t>
+            </a:r>
+            <a:endParaRPr lang="en-US" altLang="ko-KR" sz="1200" b="0" i="0" kern="1200" dirty="0">
+              <a:solidFill>
+                <a:schemeClr val="tx1"/>
+              </a:solidFill>
+              <a:effectLst/>
+              <a:latin typeface="+mn-lt"/>
+              <a:ea typeface="+mn-ea"/>
+              <a:cs typeface="+mn-cs"/>
+            </a:endParaRPr>
+          </a:p>
+          <a:p>
+            <a:endParaRPr lang="en-US" altLang="ko-KR" sz="1200" b="0" i="0" kern="1200" dirty="0">
+              <a:solidFill>
+                <a:schemeClr val="tx1"/>
+              </a:solidFill>
+              <a:effectLst/>
+              <a:latin typeface="+mn-lt"/>
+              <a:ea typeface="+mn-ea"/>
+              <a:cs typeface="+mn-cs"/>
+            </a:endParaRPr>
+          </a:p>
+          <a:p>
+            <a:r>
+              <a:rPr lang="en-US" altLang="ko-KR" sz="1200" b="0" i="0" kern="1200" dirty="0">
+                <a:solidFill>
+                  <a:schemeClr val="tx1"/>
+                </a:solidFill>
+                <a:effectLst/>
+                <a:latin typeface="+mn-lt"/>
+                <a:ea typeface="+mn-ea"/>
+                <a:cs typeface="+mn-cs"/>
+              </a:rPr>
+              <a:t>Magic number : </a:t>
+            </a:r>
+            <a:r>
+              <a:rPr lang="ko-KR" altLang="en-US" sz="1200" b="0" i="0" kern="1200" dirty="0">
+                <a:solidFill>
+                  <a:schemeClr val="tx1"/>
+                </a:solidFill>
+                <a:effectLst/>
+                <a:latin typeface="+mn-lt"/>
+                <a:ea typeface="+mn-ea"/>
+                <a:cs typeface="+mn-cs"/>
+              </a:rPr>
+              <a:t>프로그래밍 코드 안에 사용되는 상수</a:t>
+            </a:r>
+            <a:endParaRPr lang="en-US" altLang="ko-KR" sz="1200" b="0" i="0" kern="1200" dirty="0">
+              <a:solidFill>
+                <a:schemeClr val="tx1"/>
+              </a:solidFill>
+              <a:effectLst/>
+              <a:latin typeface="+mn-lt"/>
+              <a:ea typeface="+mn-ea"/>
+              <a:cs typeface="+mn-cs"/>
+            </a:endParaRPr>
+          </a:p>
+          <a:p>
+            <a:endParaRPr lang="en-US" altLang="ko-KR" dirty="0"/>
+          </a:p>
+          <a:p>
+            <a:r>
+              <a:rPr lang="ko-KR" altLang="en-US" dirty="0"/>
+              <a:t>매개변수 제거 </a:t>
+            </a:r>
+            <a:r>
+              <a:rPr lang="en-US" altLang="ko-KR" dirty="0"/>
+              <a:t>– </a:t>
+            </a:r>
+            <a:r>
+              <a:rPr lang="ko-KR" altLang="en-US" dirty="0"/>
+              <a:t>메소드로 전환 </a:t>
+            </a:r>
+            <a:r>
+              <a:rPr lang="en-US" altLang="ko-KR" dirty="0"/>
+              <a:t>: </a:t>
+            </a:r>
+            <a:r>
+              <a:rPr lang="ko-KR" altLang="en-US" dirty="0"/>
+              <a:t>매개변수로 전달하는 값이 특정 메소드의 결과값이면 이를 매개변수로 받는 메소드 안에서 호출하게 만드는 것</a:t>
+            </a:r>
+            <a:endParaRPr lang="en-US" altLang="ko-KR" dirty="0"/>
+          </a:p>
+          <a:p>
+            <a:endParaRPr lang="en-US" altLang="ko-KR" dirty="0"/>
+          </a:p>
+          <a:p>
+            <a:endParaRPr lang="en-US" altLang="ko-KR" dirty="0"/>
+          </a:p>
+          <a:p>
+            <a:r>
+              <a:rPr lang="ko-KR" altLang="en-US" dirty="0"/>
+              <a:t>상태변환 메소드와 값 반환 메서드를 분리 </a:t>
+            </a:r>
+            <a:r>
+              <a:rPr lang="en-US" altLang="ko-KR" dirty="0"/>
+              <a:t>-&gt; </a:t>
+            </a:r>
+            <a:r>
+              <a:rPr lang="ko-KR" altLang="en-US" dirty="0"/>
+              <a:t>하나의 메서드에서 두가지 기능을 하고 있음 분리</a:t>
+            </a:r>
+            <a:r>
+              <a:rPr lang="en-US" altLang="ko-KR" dirty="0"/>
+              <a:t>!! -&gt; </a:t>
+            </a:r>
+            <a:r>
+              <a:rPr lang="ko-KR" altLang="en-US" dirty="0"/>
+              <a:t>부작용이 있을 수 있음</a:t>
+            </a:r>
+            <a:r>
+              <a:rPr lang="en-US" altLang="ko-KR" dirty="0"/>
+              <a:t>!</a:t>
+            </a:r>
+            <a:endParaRPr lang="ko-KR" altLang="en-US" dirty="0"/>
+          </a:p>
+        </p:txBody>
+      </p:sp>
+      <p:sp>
+        <p:nvSpPr>
+          <p:cNvPr id="4" name="슬라이드 번호 개체 틀 3"/>
+          <p:cNvSpPr>
+            <a:spLocks noGrp="1"/>
+          </p:cNvSpPr>
+          <p:nvPr>
+            <p:ph type="sldNum" sz="quarter" idx="5"/>
+          </p:nvPr>
+        </p:nvSpPr>
+        <p:spPr/>
+        <p:txBody>
+          <a:bodyPr/>
+          <a:lstStyle/>
+          <a:p>
+            <a:fld id="{6F2E3D4E-D25E-42DA-8920-C4C893A9BA4D}" type="slidenum">
+              <a:rPr lang="ko-KR" altLang="en-US" smtClean="0"/>
+              <a:t>4</a:t>
+            </a:fld>
+            <a:endParaRPr lang="ko-KR" altLang="en-US"/>
+          </a:p>
+        </p:txBody>
+      </p:sp>
+    </p:spTree>
+    <p:extLst>
+      <p:ext uri="{BB962C8B-B14F-4D97-AF65-F5344CB8AC3E}">
+        <p14:creationId xmlns:p14="http://schemas.microsoft.com/office/powerpoint/2010/main" val="104955373"/>
+      </p:ext>
+    </p:extLst>
+  </p:cSld>
+  <p:clrMapOvr>
+    <a:masterClrMapping/>
+  </p:clrMapOvr>
+</p:notes>
+</file>
+
+<file path=ppt/notesSlides/notesSlide5.xml><?xml version="1.0" encoding="utf-8"?>
+<p:notes xmlns:a="http://schemas.openxmlformats.org/drawingml/2006/main" xmlns:r="http://schemas.openxmlformats.org/officeDocument/2006/relationships" xmlns:p="http://schemas.openxmlformats.org/presentationml/2006/main">
+  <p:cSld>
+    <p:spTree>
+      <p:nvGrpSpPr>
+        <p:cNvPr id="1" name=""/>
+        <p:cNvGrpSpPr/>
+        <p:nvPr/>
+      </p:nvGrpSpPr>
+      <p:grpSpPr>
+        <a:xfrm>
+          <a:off x="0" y="0"/>
+          <a:ext cx="0" cy="0"/>
+          <a:chOff x="0" y="0"/>
+          <a:chExt cx="0" cy="0"/>
+        </a:xfrm>
+      </p:grpSpPr>
+      <p:sp>
+        <p:nvSpPr>
+          <p:cNvPr id="2" name="슬라이드 이미지 개체 틀 1"/>
+          <p:cNvSpPr>
+            <a:spLocks noGrp="1" noRot="1" noChangeAspect="1"/>
+          </p:cNvSpPr>
+          <p:nvPr>
+            <p:ph type="sldImg"/>
+          </p:nvPr>
+        </p:nvSpPr>
+        <p:spPr/>
+      </p:sp>
+      <p:sp>
+        <p:nvSpPr>
+          <p:cNvPr id="3" name="슬라이드 노트 개체 틀 2"/>
+          <p:cNvSpPr>
+            <a:spLocks noGrp="1"/>
+          </p:cNvSpPr>
+          <p:nvPr>
+            <p:ph type="body" idx="1"/>
+          </p:nvPr>
+        </p:nvSpPr>
+        <p:spPr/>
+        <p:txBody>
+          <a:bodyPr/>
+          <a:lstStyle/>
+          <a:p>
+            <a:r>
+              <a:rPr lang="ko-KR" altLang="en-US" dirty="0" err="1"/>
+              <a:t>조건문</a:t>
+            </a:r>
+            <a:r>
+              <a:rPr lang="ko-KR" altLang="en-US" dirty="0"/>
+              <a:t> 쪼개기</a:t>
+            </a:r>
+            <a:r>
+              <a:rPr lang="en-US" altLang="ko-KR" dirty="0"/>
+              <a:t>!!</a:t>
+            </a:r>
+          </a:p>
+          <a:p>
+            <a:r>
+              <a:rPr lang="en-US" altLang="ko-KR" dirty="0"/>
+              <a:t>If, else, then </a:t>
+            </a:r>
+            <a:r>
+              <a:rPr lang="ko-KR" altLang="en-US" dirty="0"/>
+              <a:t>등에서 조건문들을 함수로 추출</a:t>
+            </a:r>
+            <a:endParaRPr lang="en-US" altLang="ko-KR" dirty="0"/>
+          </a:p>
+          <a:p>
+            <a:endParaRPr lang="en-US" altLang="ko-KR" dirty="0"/>
+          </a:p>
+          <a:p>
+            <a:r>
+              <a:rPr lang="ko-KR" altLang="en-US" dirty="0"/>
+              <a:t>각 조건의 실행 코드가 같을 때</a:t>
+            </a:r>
+            <a:r>
+              <a:rPr lang="en-US" altLang="ko-KR" dirty="0"/>
+              <a:t>, </a:t>
+            </a:r>
+            <a:r>
+              <a:rPr lang="ko-KR" altLang="en-US" dirty="0"/>
+              <a:t>또는 각 조건의 결과가 같을 때 </a:t>
+            </a:r>
+            <a:r>
+              <a:rPr lang="en-US" altLang="ko-KR" dirty="0"/>
+              <a:t>-&gt; </a:t>
+            </a:r>
+            <a:r>
+              <a:rPr lang="ko-KR" altLang="en-US" dirty="0"/>
+              <a:t>중복의 제거</a:t>
+            </a:r>
+            <a:endParaRPr lang="en-US" altLang="ko-KR" dirty="0"/>
+          </a:p>
+          <a:p>
+            <a:endParaRPr lang="en-US" altLang="ko-KR" dirty="0"/>
+          </a:p>
+          <a:p>
+            <a:r>
+              <a:rPr lang="ko-KR" altLang="en-US" dirty="0"/>
+              <a:t>하위클래스 들에서 필드</a:t>
+            </a:r>
+            <a:r>
+              <a:rPr lang="en-US" altLang="ko-KR" dirty="0"/>
+              <a:t>, </a:t>
+            </a:r>
+            <a:r>
+              <a:rPr lang="ko-KR" altLang="en-US" dirty="0"/>
+              <a:t>메소드들이 중복된 경우</a:t>
+            </a:r>
+            <a:r>
+              <a:rPr lang="en-US" altLang="ko-KR" dirty="0"/>
+              <a:t>!</a:t>
+            </a:r>
+          </a:p>
+          <a:p>
+            <a:r>
+              <a:rPr lang="en-US" altLang="ko-KR" dirty="0"/>
+              <a:t>-&gt; </a:t>
+            </a:r>
+            <a:r>
+              <a:rPr lang="ko-KR" altLang="en-US" dirty="0"/>
+              <a:t>상위클래스로 </a:t>
+            </a:r>
+            <a:r>
+              <a:rPr lang="ko-KR" altLang="en-US" dirty="0" err="1"/>
+              <a:t>상향시킨다</a:t>
+            </a:r>
+            <a:r>
+              <a:rPr lang="en-US" altLang="ko-KR" dirty="0"/>
+              <a:t>.</a:t>
+            </a:r>
+          </a:p>
+          <a:p>
+            <a:endParaRPr lang="en-US" altLang="ko-KR" dirty="0"/>
+          </a:p>
+          <a:p>
+            <a:endParaRPr lang="en-US" altLang="ko-KR" dirty="0"/>
+          </a:p>
+          <a:p>
+            <a:r>
+              <a:rPr lang="ko-KR" altLang="en-US" dirty="0"/>
+              <a:t>상위클래스의 필드</a:t>
+            </a:r>
+            <a:r>
+              <a:rPr lang="en-US" altLang="ko-KR" dirty="0"/>
+              <a:t>, </a:t>
+            </a:r>
+            <a:r>
+              <a:rPr lang="ko-KR" altLang="en-US" dirty="0"/>
+              <a:t>메소드들이 특정 하위클래스에서만 사용된다</a:t>
+            </a:r>
+            <a:endParaRPr lang="en-US" altLang="ko-KR" dirty="0"/>
+          </a:p>
+          <a:p>
+            <a:r>
+              <a:rPr lang="en-US" altLang="ko-KR" dirty="0"/>
+              <a:t>-&gt; </a:t>
+            </a:r>
+            <a:r>
+              <a:rPr lang="ko-KR" altLang="en-US" dirty="0"/>
+              <a:t>하위클래스로 </a:t>
+            </a:r>
+            <a:r>
+              <a:rPr lang="ko-KR" altLang="en-US" dirty="0" err="1"/>
+              <a:t>하향시킨다</a:t>
+            </a:r>
+            <a:r>
+              <a:rPr lang="en-US" altLang="ko-KR" dirty="0"/>
+              <a:t>.</a:t>
+            </a:r>
+          </a:p>
+          <a:p>
+            <a:endParaRPr lang="en-US" altLang="ko-KR" dirty="0"/>
+          </a:p>
+          <a:p>
+            <a:endParaRPr lang="en-US" altLang="ko-KR" dirty="0"/>
+          </a:p>
+          <a:p>
+            <a:r>
+              <a:rPr lang="ko-KR" altLang="en-US" dirty="0"/>
+              <a:t>메소드가 완전히 똑같지 않다면</a:t>
+            </a:r>
+            <a:r>
+              <a:rPr lang="en-US" altLang="ko-KR" dirty="0"/>
+              <a:t>?</a:t>
+            </a:r>
+          </a:p>
+          <a:p>
+            <a:r>
+              <a:rPr lang="en-US" altLang="ko-KR" dirty="0"/>
+              <a:t>-&gt; </a:t>
+            </a:r>
+            <a:r>
+              <a:rPr lang="ko-KR" altLang="en-US" dirty="0" err="1"/>
+              <a:t>상향시키기</a:t>
+            </a:r>
+            <a:r>
+              <a:rPr lang="ko-KR" altLang="en-US" dirty="0"/>
+              <a:t> 어려움</a:t>
+            </a:r>
+            <a:r>
+              <a:rPr lang="en-US" altLang="ko-KR" dirty="0"/>
+              <a:t>… -&gt; </a:t>
+            </a:r>
+            <a:r>
+              <a:rPr lang="ko-KR" altLang="en-US" dirty="0"/>
+              <a:t>템플릿 메소드 생성 </a:t>
+            </a:r>
+            <a:r>
+              <a:rPr lang="en-US" altLang="ko-KR" dirty="0"/>
+              <a:t>(</a:t>
+            </a:r>
+            <a:r>
+              <a:rPr lang="ko-KR" altLang="en-US" dirty="0"/>
+              <a:t>중복된 부분을 가능한한 없애고 차이가 있는 필수 부분만 그대로 두는 것</a:t>
+            </a:r>
+            <a:r>
+              <a:rPr lang="en-US" altLang="ko-KR"/>
+              <a:t>)</a:t>
+            </a:r>
+            <a:endParaRPr lang="ko-KR" altLang="en-US" dirty="0"/>
+          </a:p>
+        </p:txBody>
+      </p:sp>
+      <p:sp>
+        <p:nvSpPr>
+          <p:cNvPr id="4" name="슬라이드 번호 개체 틀 3"/>
+          <p:cNvSpPr>
+            <a:spLocks noGrp="1"/>
+          </p:cNvSpPr>
+          <p:nvPr>
+            <p:ph type="sldNum" sz="quarter" idx="5"/>
+          </p:nvPr>
+        </p:nvSpPr>
+        <p:spPr/>
+        <p:txBody>
+          <a:bodyPr/>
+          <a:lstStyle/>
+          <a:p>
+            <a:fld id="{6F2E3D4E-D25E-42DA-8920-C4C893A9BA4D}" type="slidenum">
+              <a:rPr lang="ko-KR" altLang="en-US" smtClean="0"/>
+              <a:t>5</a:t>
+            </a:fld>
+            <a:endParaRPr lang="ko-KR" altLang="en-US"/>
+          </a:p>
+        </p:txBody>
+      </p:sp>
+    </p:spTree>
+    <p:extLst>
+      <p:ext uri="{BB962C8B-B14F-4D97-AF65-F5344CB8AC3E}">
+        <p14:creationId xmlns:p14="http://schemas.microsoft.com/office/powerpoint/2010/main" val="1602407348"/>
+      </p:ext>
+    </p:extLst>
+  </p:cSld>
+  <p:clrMapOvr>
+    <a:masterClrMapping/>
+  </p:clrMapOvr>
+</p:notes>
+</file>
+
 <file path=ppt/slideLayouts/slideLayout1.xml><?xml version="1.0" encoding="utf-8"?>
 <p:sldLayout xmlns:a="http://schemas.openxmlformats.org/drawingml/2006/main" xmlns:r="http://schemas.openxmlformats.org/officeDocument/2006/relationships" xmlns:p="http://schemas.openxmlformats.org/presentationml/2006/main" type="title" preserve="1">
   <p:cSld name="제목 슬라이드">
@@ -247,7 +1697,7 @@
           <a:p>
             <a:fld id="{586510D1-98F1-4355-BDAA-218C686EBBE8}" type="datetimeFigureOut">
               <a:rPr lang="ko-KR" altLang="en-US" smtClean="0"/>
-              <a:t>2020-02-14</a:t>
+              <a:t>2020-02-15</a:t>
             </a:fld>
             <a:endParaRPr lang="ko-KR" altLang="en-US"/>
           </a:p>
@@ -417,7 +1867,7 @@
           <a:p>
             <a:fld id="{586510D1-98F1-4355-BDAA-218C686EBBE8}" type="datetimeFigureOut">
               <a:rPr lang="ko-KR" altLang="en-US" smtClean="0"/>
-              <a:t>2020-02-14</a:t>
+              <a:t>2020-02-15</a:t>
             </a:fld>
             <a:endParaRPr lang="ko-KR" altLang="en-US"/>
           </a:p>
@@ -597,7 +2047,7 @@
           <a:p>
             <a:fld id="{586510D1-98F1-4355-BDAA-218C686EBBE8}" type="datetimeFigureOut">
               <a:rPr lang="ko-KR" altLang="en-US" smtClean="0"/>
-              <a:t>2020-02-14</a:t>
+              <a:t>2020-02-15</a:t>
             </a:fld>
             <a:endParaRPr lang="ko-KR" altLang="en-US"/>
           </a:p>
@@ -767,7 +2217,7 @@
           <a:p>
             <a:fld id="{586510D1-98F1-4355-BDAA-218C686EBBE8}" type="datetimeFigureOut">
               <a:rPr lang="ko-KR" altLang="en-US" smtClean="0"/>
-              <a:t>2020-02-14</a:t>
+              <a:t>2020-02-15</a:t>
             </a:fld>
             <a:endParaRPr lang="ko-KR" altLang="en-US"/>
           </a:p>
@@ -1011,7 +2461,7 @@
           <a:p>
             <a:fld id="{586510D1-98F1-4355-BDAA-218C686EBBE8}" type="datetimeFigureOut">
               <a:rPr lang="ko-KR" altLang="en-US" smtClean="0"/>
-              <a:t>2020-02-14</a:t>
+              <a:t>2020-02-15</a:t>
             </a:fld>
             <a:endParaRPr lang="ko-KR" altLang="en-US"/>
           </a:p>
@@ -1243,7 +2693,7 @@
           <a:p>
             <a:fld id="{586510D1-98F1-4355-BDAA-218C686EBBE8}" type="datetimeFigureOut">
               <a:rPr lang="ko-KR" altLang="en-US" smtClean="0"/>
-              <a:t>2020-02-14</a:t>
+              <a:t>2020-02-15</a:t>
             </a:fld>
             <a:endParaRPr lang="ko-KR" altLang="en-US"/>
           </a:p>
@@ -1610,7 +3060,7 @@
           <a:p>
             <a:fld id="{586510D1-98F1-4355-BDAA-218C686EBBE8}" type="datetimeFigureOut">
               <a:rPr lang="ko-KR" altLang="en-US" smtClean="0"/>
-              <a:t>2020-02-14</a:t>
+              <a:t>2020-02-15</a:t>
             </a:fld>
             <a:endParaRPr lang="ko-KR" altLang="en-US"/>
           </a:p>
@@ -1728,7 +3178,7 @@
           <a:p>
             <a:fld id="{586510D1-98F1-4355-BDAA-218C686EBBE8}" type="datetimeFigureOut">
               <a:rPr lang="ko-KR" altLang="en-US" smtClean="0"/>
-              <a:t>2020-02-14</a:t>
+              <a:t>2020-02-15</a:t>
             </a:fld>
             <a:endParaRPr lang="ko-KR" altLang="en-US"/>
           </a:p>
@@ -1823,7 +3273,7 @@
           <a:p>
             <a:fld id="{586510D1-98F1-4355-BDAA-218C686EBBE8}" type="datetimeFigureOut">
               <a:rPr lang="ko-KR" altLang="en-US" smtClean="0"/>
-              <a:t>2020-02-14</a:t>
+              <a:t>2020-02-15</a:t>
             </a:fld>
             <a:endParaRPr lang="ko-KR" altLang="en-US"/>
           </a:p>
@@ -2100,7 +3550,7 @@
           <a:p>
             <a:fld id="{586510D1-98F1-4355-BDAA-218C686EBBE8}" type="datetimeFigureOut">
               <a:rPr lang="ko-KR" altLang="en-US" smtClean="0"/>
-              <a:t>2020-02-14</a:t>
+              <a:t>2020-02-15</a:t>
             </a:fld>
             <a:endParaRPr lang="ko-KR" altLang="en-US"/>
           </a:p>
@@ -2357,7 +3807,7 @@
           <a:p>
             <a:fld id="{586510D1-98F1-4355-BDAA-218C686EBBE8}" type="datetimeFigureOut">
               <a:rPr lang="ko-KR" altLang="en-US" smtClean="0"/>
-              <a:t>2020-02-14</a:t>
+              <a:t>2020-02-15</a:t>
             </a:fld>
             <a:endParaRPr lang="ko-KR" altLang="en-US"/>
           </a:p>
@@ -2570,7 +4020,7 @@
           <a:p>
             <a:fld id="{586510D1-98F1-4355-BDAA-218C686EBBE8}" type="datetimeFigureOut">
               <a:rPr lang="ko-KR" altLang="en-US" smtClean="0"/>
-              <a:t>2020-02-14</a:t>
+              <a:t>2020-02-15</a:t>
             </a:fld>
             <a:endParaRPr lang="ko-KR" altLang="en-US"/>
           </a:p>
@@ -3288,7 +4738,7 @@
           <a:p>
             <a:r>
               <a:rPr lang="ko-KR" altLang="en-US" dirty="0"/>
-              <a:t>메소드 추출 </a:t>
+              <a:t>메서드 추출 </a:t>
             </a:r>
             <a:r>
               <a:rPr lang="ko-KR" altLang="en-US" b="1" dirty="0">
@@ -3406,7 +4856,7 @@
             </a:r>
             <a:r>
               <a:rPr lang="ko-KR" altLang="en-US" dirty="0"/>
-              <a:t>메소드</a:t>
+              <a:t>메서드</a:t>
             </a:r>
           </a:p>
         </p:txBody>
@@ -3477,7 +4927,7 @@
             <a:pPr lvl="1"/>
             <a:r>
               <a:rPr lang="ko-KR" altLang="en-US" dirty="0"/>
-              <a:t>메소드로 추출</a:t>
+              <a:t>메소드로 전환</a:t>
             </a:r>
             <a:endParaRPr lang="en-US" altLang="ko-KR" dirty="0"/>
           </a:p>
@@ -3913,4 +5363,299 @@
     </a:ext>
   </a:extLst>
 </a:theme>
+</file>
+
+<file path=ppt/theme/theme2.xml><?xml version="1.0" encoding="utf-8"?>
+<a:theme xmlns:a="http://schemas.openxmlformats.org/drawingml/2006/main" name="Office 테마">
+  <a:themeElements>
+    <a:clrScheme name="Office">
+      <a:dk1>
+        <a:sysClr val="windowText" lastClr="000000"/>
+      </a:dk1>
+      <a:lt1>
+        <a:sysClr val="window" lastClr="FFFFFF"/>
+      </a:lt1>
+      <a:dk2>
+        <a:srgbClr val="44546A"/>
+      </a:dk2>
+      <a:lt2>
+        <a:srgbClr val="E7E6E6"/>
+      </a:lt2>
+      <a:accent1>
+        <a:srgbClr val="4472C4"/>
+      </a:accent1>
+      <a:accent2>
+        <a:srgbClr val="ED7D31"/>
+      </a:accent2>
+      <a:accent3>
+        <a:srgbClr val="A5A5A5"/>
+      </a:accent3>
+      <a:accent4>
+        <a:srgbClr val="FFC000"/>
+      </a:accent4>
+      <a:accent5>
+        <a:srgbClr val="5B9BD5"/>
+      </a:accent5>
+      <a:accent6>
+        <a:srgbClr val="70AD47"/>
+      </a:accent6>
+      <a:hlink>
+        <a:srgbClr val="0563C1"/>
+      </a:hlink>
+      <a:folHlink>
+        <a:srgbClr val="954F72"/>
+      </a:folHlink>
+    </a:clrScheme>
+    <a:fontScheme name="Office">
+      <a:majorFont>
+        <a:latin typeface="맑은 고딕" panose="020F0302020204030204"/>
+        <a:ea typeface=""/>
+        <a:cs typeface=""/>
+        <a:font script="Jpan" typeface="游ゴシック Light"/>
+        <a:font script="Hang" typeface="맑은 고딕"/>
+        <a:font script="Hans" typeface="等线 Light"/>
+        <a:font script="Hant" typeface="新細明體"/>
+        <a:font script="Arab" typeface="Times New Roman"/>
+        <a:font script="Hebr" typeface="Times New Roman"/>
+        <a:font script="Thai" typeface="Angsana New"/>
+        <a:font script="Ethi" typeface="Nyala"/>
+        <a:font script="Beng" typeface="Vrinda"/>
+        <a:font script="Gujr" typeface="Shruti"/>
+        <a:font script="Khmr" typeface="MoolBoran"/>
+        <a:font script="Knda" typeface="Tunga"/>
+        <a:font script="Guru" typeface="Raavi"/>
+        <a:font script="Cans" typeface="Euphemia"/>
+        <a:font script="Cher" typeface="Plantagenet Cherokee"/>
+        <a:font script="Yiii" typeface="Microsoft Yi Baiti"/>
+        <a:font script="Tibt" typeface="Microsoft Himalaya"/>
+        <a:font script="Thaa" typeface="MV Boli"/>
+        <a:font script="Deva" typeface="Mangal"/>
+        <a:font script="Telu" typeface="Gautami"/>
+        <a:font script="Taml" typeface="Latha"/>
+        <a:font script="Syrc" typeface="Estrangelo Edessa"/>
+        <a:font script="Orya" typeface="Kalinga"/>
+        <a:font script="Mlym" typeface="Kartika"/>
+        <a:font script="Laoo" typeface="DokChampa"/>
+        <a:font script="Sinh" typeface="Iskoola Pota"/>
+        <a:font script="Mong" typeface="Mongolian Baiti"/>
+        <a:font script="Viet" typeface="Times New Roman"/>
+        <a:font script="Uigh" typeface="Microsoft Uighur"/>
+        <a:font script="Geor" typeface="Sylfaen"/>
+        <a:font script="Armn" typeface="Arial"/>
+        <a:font script="Bugi" typeface="Leelawadee UI"/>
+        <a:font script="Bopo" typeface="Microsoft JhengHei"/>
+        <a:font script="Java" typeface="Javanese Text"/>
+        <a:font script="Lisu" typeface="Segoe UI"/>
+        <a:font script="Mymr" typeface="Myanmar Text"/>
+        <a:font script="Nkoo" typeface="Ebrima"/>
+        <a:font script="Olck" typeface="Nirmala UI"/>
+        <a:font script="Osma" typeface="Ebrima"/>
+        <a:font script="Phag" typeface="Phagspa"/>
+        <a:font script="Syrn" typeface="Estrangelo Edessa"/>
+        <a:font script="Syrj" typeface="Estrangelo Edessa"/>
+        <a:font script="Syre" typeface="Estrangelo Edessa"/>
+        <a:font script="Sora" typeface="Nirmala UI"/>
+        <a:font script="Tale" typeface="Microsoft Tai Le"/>
+        <a:font script="Talu" typeface="Microsoft New Tai Lue"/>
+        <a:font script="Tfng" typeface="Ebrima"/>
+      </a:majorFont>
+      <a:minorFont>
+        <a:latin typeface="맑은 고딕" panose="020F0502020204030204"/>
+        <a:ea typeface=""/>
+        <a:cs typeface=""/>
+        <a:font script="Jpan" typeface="游ゴシック"/>
+        <a:font script="Hang" typeface="맑은 고딕"/>
+        <a:font script="Hans" typeface="等线"/>
+        <a:font script="Hant" typeface="新細明體"/>
+        <a:font script="Arab" typeface="Arial"/>
+        <a:font script="Hebr" typeface="Arial"/>
+        <a:font script="Thai" typeface="Cordia New"/>
+        <a:font script="Ethi" typeface="Nyala"/>
+        <a:font script="Beng" typeface="Vrinda"/>
+        <a:font script="Gujr" typeface="Shruti"/>
+        <a:font script="Khmr" typeface="DaunPenh"/>
+        <a:font script="Knda" typeface="Tunga"/>
+        <a:font script="Guru" typeface="Raavi"/>
+        <a:font script="Cans" typeface="Euphemia"/>
+        <a:font script="Cher" typeface="Plantagenet Cherokee"/>
+        <a:font script="Yiii" typeface="Microsoft Yi Baiti"/>
+        <a:font script="Tibt" typeface="Microsoft Himalaya"/>
+        <a:font script="Thaa" typeface="MV Boli"/>
+        <a:font script="Deva" typeface="Mangal"/>
+        <a:font script="Telu" typeface="Gautami"/>
+        <a:font script="Taml" typeface="Latha"/>
+        <a:font script="Syrc" typeface="Estrangelo Edessa"/>
+        <a:font script="Orya" typeface="Kalinga"/>
+        <a:font script="Mlym" typeface="Kartika"/>
+        <a:font script="Laoo" typeface="DokChampa"/>
+        <a:font script="Sinh" typeface="Iskoola Pota"/>
+        <a:font script="Mong" typeface="Mongolian Baiti"/>
+        <a:font script="Viet" typeface="Arial"/>
+        <a:font script="Uigh" typeface="Microsoft Uighur"/>
+        <a:font script="Geor" typeface="Sylfaen"/>
+        <a:font script="Armn" typeface="Arial"/>
+        <a:font script="Bugi" typeface="Leelawadee UI"/>
+        <a:font script="Bopo" typeface="Microsoft JhengHei"/>
+        <a:font script="Java" typeface="Javanese Text"/>
+        <a:font script="Lisu" typeface="Segoe UI"/>
+        <a:font script="Mymr" typeface="Myanmar Text"/>
+        <a:font script="Nkoo" typeface="Ebrima"/>
+        <a:font script="Olck" typeface="Nirmala UI"/>
+        <a:font script="Osma" typeface="Ebrima"/>
+        <a:font script="Phag" typeface="Phagspa"/>
+        <a:font script="Syrn" typeface="Estrangelo Edessa"/>
+        <a:font script="Syrj" typeface="Estrangelo Edessa"/>
+        <a:font script="Syre" typeface="Estrangelo Edessa"/>
+        <a:font script="Sora" typeface="Nirmala UI"/>
+        <a:font script="Tale" typeface="Microsoft Tai Le"/>
+        <a:font script="Talu" typeface="Microsoft New Tai Lue"/>
+        <a:font script="Tfng" typeface="Ebrima"/>
+      </a:minorFont>
+    </a:fontScheme>
+    <a:fmtScheme name="Office">
+      <a:fillStyleLst>
+        <a:solidFill>
+          <a:schemeClr val="phClr"/>
+        </a:solidFill>
+        <a:gradFill rotWithShape="1">
+          <a:gsLst>
+            <a:gs pos="0">
+              <a:schemeClr val="phClr">
+                <a:lumMod val="110000"/>
+                <a:satMod val="105000"/>
+                <a:tint val="67000"/>
+              </a:schemeClr>
+            </a:gs>
+            <a:gs pos="50000">
+              <a:schemeClr val="phClr">
+                <a:lumMod val="105000"/>
+                <a:satMod val="103000"/>
+                <a:tint val="73000"/>
+              </a:schemeClr>
+            </a:gs>
+            <a:gs pos="100000">
+              <a:schemeClr val="phClr">
+                <a:lumMod val="105000"/>
+                <a:satMod val="109000"/>
+                <a:tint val="81000"/>
+              </a:schemeClr>
+            </a:gs>
+          </a:gsLst>
+          <a:lin ang="5400000" scaled="0"/>
+        </a:gradFill>
+        <a:gradFill rotWithShape="1">
+          <a:gsLst>
+            <a:gs pos="0">
+              <a:schemeClr val="phClr">
+                <a:satMod val="103000"/>
+                <a:lumMod val="102000"/>
+                <a:tint val="94000"/>
+              </a:schemeClr>
+            </a:gs>
+            <a:gs pos="50000">
+              <a:schemeClr val="phClr">
+                <a:satMod val="110000"/>
+                <a:lumMod val="100000"/>
+                <a:shade val="100000"/>
+              </a:schemeClr>
+            </a:gs>
+            <a:gs pos="100000">
+              <a:schemeClr val="phClr">
+                <a:lumMod val="99000"/>
+                <a:satMod val="120000"/>
+                <a:shade val="78000"/>
+              </a:schemeClr>
+            </a:gs>
+          </a:gsLst>
+          <a:lin ang="5400000" scaled="0"/>
+        </a:gradFill>
+      </a:fillStyleLst>
+      <a:lnStyleLst>
+        <a:ln w="6350" cap="flat" cmpd="sng" algn="ctr">
+          <a:solidFill>
+            <a:schemeClr val="phClr"/>
+          </a:solidFill>
+          <a:prstDash val="solid"/>
+          <a:miter lim="800000"/>
+        </a:ln>
+        <a:ln w="12700" cap="flat" cmpd="sng" algn="ctr">
+          <a:solidFill>
+            <a:schemeClr val="phClr"/>
+          </a:solidFill>
+          <a:prstDash val="solid"/>
+          <a:miter lim="800000"/>
+        </a:ln>
+        <a:ln w="19050" cap="flat" cmpd="sng" algn="ctr">
+          <a:solidFill>
+            <a:schemeClr val="phClr"/>
+          </a:solidFill>
+          <a:prstDash val="solid"/>
+          <a:miter lim="800000"/>
+        </a:ln>
+      </a:lnStyleLst>
+      <a:effectStyleLst>
+        <a:effectStyle>
+          <a:effectLst/>
+        </a:effectStyle>
+        <a:effectStyle>
+          <a:effectLst/>
+        </a:effectStyle>
+        <a:effectStyle>
+          <a:effectLst>
+            <a:outerShdw blurRad="57150" dist="19050" dir="5400000" algn="ctr" rotWithShape="0">
+              <a:srgbClr val="000000">
+                <a:alpha val="63000"/>
+              </a:srgbClr>
+            </a:outerShdw>
+          </a:effectLst>
+        </a:effectStyle>
+      </a:effectStyleLst>
+      <a:bgFillStyleLst>
+        <a:solidFill>
+          <a:schemeClr val="phClr"/>
+        </a:solidFill>
+        <a:solidFill>
+          <a:schemeClr val="phClr">
+            <a:tint val="95000"/>
+            <a:satMod val="170000"/>
+          </a:schemeClr>
+        </a:solidFill>
+        <a:gradFill rotWithShape="1">
+          <a:gsLst>
+            <a:gs pos="0">
+              <a:schemeClr val="phClr">
+                <a:tint val="93000"/>
+                <a:satMod val="150000"/>
+                <a:shade val="98000"/>
+                <a:lumMod val="102000"/>
+              </a:schemeClr>
+            </a:gs>
+            <a:gs pos="50000">
+              <a:schemeClr val="phClr">
+                <a:tint val="98000"/>
+                <a:satMod val="130000"/>
+                <a:shade val="90000"/>
+                <a:lumMod val="103000"/>
+              </a:schemeClr>
+            </a:gs>
+            <a:gs pos="100000">
+              <a:schemeClr val="phClr">
+                <a:shade val="63000"/>
+                <a:satMod val="120000"/>
+              </a:schemeClr>
+            </a:gs>
+          </a:gsLst>
+          <a:lin ang="5400000" scaled="0"/>
+        </a:gradFill>
+      </a:bgFillStyleLst>
+    </a:fmtScheme>
+  </a:themeElements>
+  <a:objectDefaults/>
+  <a:extraClrSchemeLst/>
+  <a:extLst>
+    <a:ext uri="{05A4C25C-085E-4340-85A3-A5531E510DB2}">
+      <thm15:themeFamily xmlns:thm15="http://schemas.microsoft.com/office/thememl/2012/main" name="Office Theme" id="{62F939B6-93AF-4DB8-9C6B-D6C7DFDC589F}" vid="{4A3C46E8-61CC-4603-A589-7422A47A8E4A}"/>
+    </a:ext>
+  </a:extLst>
+</a:theme>
 </file>
</xml_diff>